<commit_message>
20220612 jsw Feat : 3주차 ppt 업데이트
</commit_message>
<xml_diff>
--- a/docs/nlp_IRun_03.pptx
+++ b/docs/nlp_IRun_03.pptx
@@ -23,21 +23,21 @@
   <p:notesSz cx="6858000" cy="9144000"/>
   <p:embeddedFontLst>
     <p:embeddedFont>
-      <p:font typeface="나눔스퀘어" panose="020B0600000101010101" pitchFamily="50" charset="-127"/>
+      <p:font typeface="Cambria Math" panose="02040503050406030204" pitchFamily="18" charset="0"/>
       <p:regular r:id="rId15"/>
     </p:embeddedFont>
     <p:embeddedFont>
+      <p:font typeface="나눔스퀘어" panose="020B0600000101010101" pitchFamily="50" charset="-127"/>
+      <p:regular r:id="rId16"/>
+    </p:embeddedFont>
+    <p:embeddedFont>
       <p:font typeface="나눔스퀘어 Bold" panose="020B0600000101010101" pitchFamily="50" charset="-127"/>
-      <p:bold r:id="rId16"/>
+      <p:bold r:id="rId17"/>
     </p:embeddedFont>
     <p:embeddedFont>
       <p:font typeface="맑은 고딕" panose="020B0503020000020004" pitchFamily="50" charset="-127"/>
-      <p:regular r:id="rId17"/>
-      <p:bold r:id="rId18"/>
-    </p:embeddedFont>
-    <p:embeddedFont>
-      <p:font typeface="Cambria Math" panose="02040503050406030204" pitchFamily="18" charset="0"/>
-      <p:regular r:id="rId19"/>
+      <p:regular r:id="rId18"/>
+      <p:bold r:id="rId19"/>
     </p:embeddedFont>
   </p:embeddedFontLst>
   <p:defaultTextStyle>
@@ -3855,6 +3855,20 @@
               <a:t>Tweets contains not enough words compared to scripts, novel, or even news articles (average 11 words in a tweet)</a:t>
             </a:r>
           </a:p>
+          <a:p>
+            <a:pPr>
+              <a:lnSpc>
+                <a:spcPct val="150000"/>
+              </a:lnSpc>
+            </a:pPr>
+            <a:r>
+              <a:rPr lang="en-US" altLang="ko-KR" dirty="0">
+                <a:latin typeface="나눔스퀘어" panose="020B0600000101010101" pitchFamily="50" charset="-127"/>
+                <a:ea typeface="나눔스퀘어" panose="020B0600000101010101" pitchFamily="50" charset="-127"/>
+              </a:rPr>
+              <a:t>Certain document has more words -&gt; split into groups delicately, more documents</a:t>
+            </a:r>
+          </a:p>
         </p:txBody>
       </p:sp>
     </p:spTree>
@@ -4456,7 +4470,9 @@
         </p:nvSpPr>
         <p:spPr/>
         <p:txBody>
-          <a:bodyPr/>
+          <a:bodyPr>
+            <a:normAutofit fontScale="92500"/>
+          </a:bodyPr>
           <a:lstStyle/>
           <a:p>
             <a:pPr>
@@ -4469,7 +4485,7 @@
                 <a:latin typeface="나눔스퀘어" panose="020B0600000101010101" pitchFamily="50" charset="-127"/>
                 <a:ea typeface="나눔스퀘어" panose="020B0600000101010101" pitchFamily="50" charset="-127"/>
               </a:rPr>
-              <a:t>1. Finished making tweeter API and Football API crawler, Collected total ~3000 documents (tweets) </a:t>
+              <a:t>1. Finished making tweeter API and Football API crawler, Collected total ~5000 documents (tweets) </a:t>
             </a:r>
           </a:p>
           <a:p>
@@ -4483,7 +4499,7 @@
                 <a:latin typeface="나눔스퀘어" panose="020B0600000101010101" pitchFamily="50" charset="-127"/>
                 <a:ea typeface="나눔스퀘어" panose="020B0600000101010101" pitchFamily="50" charset="-127"/>
               </a:rPr>
-              <a:t>2. Constructed TF-IDF Model</a:t>
+              <a:t>2. Made corpus data, divided into total 6 groups by rating</a:t>
             </a:r>
           </a:p>
           <a:p>
@@ -4497,7 +4513,21 @@
                 <a:latin typeface="나눔스퀘어" panose="020B0600000101010101" pitchFamily="50" charset="-127"/>
                 <a:ea typeface="나눔스퀘어" panose="020B0600000101010101" pitchFamily="50" charset="-127"/>
               </a:rPr>
-              <a:t>3. Made corpus data, divided into total 6 groups by rating</a:t>
+              <a:t>3. Constructed TF-IDF Model</a:t>
+            </a:r>
+          </a:p>
+          <a:p>
+            <a:pPr>
+              <a:lnSpc>
+                <a:spcPct val="150000"/>
+              </a:lnSpc>
+            </a:pPr>
+            <a:r>
+              <a:rPr lang="en-US" altLang="ko-KR" dirty="0">
+                <a:latin typeface="나눔스퀘어" panose="020B0600000101010101" pitchFamily="50" charset="-127"/>
+                <a:ea typeface="나눔스퀘어" panose="020B0600000101010101" pitchFamily="50" charset="-127"/>
+              </a:rPr>
+              <a:t>4. Computed cosine similarity between input query and documents</a:t>
             </a:r>
             <a:br>
               <a:rPr lang="en-US" altLang="ko-KR" dirty="0">
@@ -4624,7 +4654,7 @@
                 <a:latin typeface="나눔스퀘어" panose="020B0600000101010101" pitchFamily="50" charset="-127"/>
                 <a:ea typeface="나눔스퀘어" panose="020B0600000101010101" pitchFamily="50" charset="-127"/>
               </a:rPr>
-              <a:t>Collected total N tweets, divided into 6 groups by player’s rating after the fixture</a:t>
+              <a:t>Collected total 4730 tweets, divided into 6 groups by player’s rating after the fixture</a:t>
             </a:r>
             <a:br>
               <a:rPr lang="en-US" altLang="ko-KR" dirty="0">
@@ -5979,8 +6009,8 @@
           </a:p>
         </p:txBody>
       </p:sp>
-      <mc:AlternateContent xmlns:mc="http://schemas.openxmlformats.org/markup-compatibility/2006">
-        <mc:Choice xmlns:a14="http://schemas.microsoft.com/office/drawing/2010/main" Requires="a14">
+      <mc:AlternateContent xmlns:mc="http://schemas.openxmlformats.org/markup-compatibility/2006" xmlns:a14="http://schemas.microsoft.com/office/drawing/2010/main">
+        <mc:Choice Requires="a14">
           <p:sp>
             <p:nvSpPr>
               <p:cNvPr id="3" name="내용 개체 틀 2">
@@ -6134,7 +6164,7 @@
             </p:txBody>
           </p:sp>
         </mc:Choice>
-        <mc:Fallback>
+        <mc:Fallback xmlns="">
           <p:sp>
             <p:nvSpPr>
               <p:cNvPr id="3" name="내용 개체 틀 2">

</xml_diff>